<commit_message>
Add a tank color class
</commit_message>
<xml_diff>
--- a/app/src/misc/Tank Images.pptx
+++ b/app/src/misc/Tank Images.pptx
@@ -1,6 +1,6 @@
 
 <file path=ppt/presentation.xml><?xml version="1.0" encoding="utf-8"?>
-<p:presentation xmlns:a="http://schemas.openxmlformats.org/drawingml/2006/main" xmlns:r="http://schemas.openxmlformats.org/officeDocument/2006/relationships" xmlns:p="http://schemas.openxmlformats.org/presentationml/2006/main" saveSubsetFonts="1">
+<p:presentation xmlns:a="http://schemas.openxmlformats.org/drawingml/2006/main" xmlns:r="http://schemas.openxmlformats.org/officeDocument/2006/relationships" xmlns:p="http://schemas.openxmlformats.org/presentationml/2006/main" saveSubsetFonts="1" autoCompressPictures="0">
   <p:sldMasterIdLst>
     <p:sldMasterId id="2147483648" r:id="rId1"/>
   </p:sldMasterIdLst>
@@ -261,7 +261,7 @@
           <a:p>
             <a:fld id="{6CEAB757-8E6E-4ABD-BC45-881DC5CE9DE2}" type="datetimeFigureOut">
               <a:rPr lang="en-US" smtClean="0"/>
-              <a:t>2018-12-24</a:t>
+              <a:t>2019-03-22</a:t>
             </a:fld>
             <a:endParaRPr lang="en-US"/>
           </a:p>
@@ -459,7 +459,7 @@
           <a:p>
             <a:fld id="{6CEAB757-8E6E-4ABD-BC45-881DC5CE9DE2}" type="datetimeFigureOut">
               <a:rPr lang="en-US" smtClean="0"/>
-              <a:t>2018-12-24</a:t>
+              <a:t>2019-03-22</a:t>
             </a:fld>
             <a:endParaRPr lang="en-US"/>
           </a:p>
@@ -667,7 +667,7 @@
           <a:p>
             <a:fld id="{6CEAB757-8E6E-4ABD-BC45-881DC5CE9DE2}" type="datetimeFigureOut">
               <a:rPr lang="en-US" smtClean="0"/>
-              <a:t>2018-12-24</a:t>
+              <a:t>2019-03-22</a:t>
             </a:fld>
             <a:endParaRPr lang="en-US"/>
           </a:p>
@@ -865,7 +865,7 @@
           <a:p>
             <a:fld id="{6CEAB757-8E6E-4ABD-BC45-881DC5CE9DE2}" type="datetimeFigureOut">
               <a:rPr lang="en-US" smtClean="0"/>
-              <a:t>2018-12-24</a:t>
+              <a:t>2019-03-22</a:t>
             </a:fld>
             <a:endParaRPr lang="en-US"/>
           </a:p>
@@ -1140,7 +1140,7 @@
           <a:p>
             <a:fld id="{6CEAB757-8E6E-4ABD-BC45-881DC5CE9DE2}" type="datetimeFigureOut">
               <a:rPr lang="en-US" smtClean="0"/>
-              <a:t>2018-12-24</a:t>
+              <a:t>2019-03-22</a:t>
             </a:fld>
             <a:endParaRPr lang="en-US"/>
           </a:p>
@@ -1405,7 +1405,7 @@
           <a:p>
             <a:fld id="{6CEAB757-8E6E-4ABD-BC45-881DC5CE9DE2}" type="datetimeFigureOut">
               <a:rPr lang="en-US" smtClean="0"/>
-              <a:t>2018-12-24</a:t>
+              <a:t>2019-03-22</a:t>
             </a:fld>
             <a:endParaRPr lang="en-US"/>
           </a:p>
@@ -1817,7 +1817,7 @@
           <a:p>
             <a:fld id="{6CEAB757-8E6E-4ABD-BC45-881DC5CE9DE2}" type="datetimeFigureOut">
               <a:rPr lang="en-US" smtClean="0"/>
-              <a:t>2018-12-24</a:t>
+              <a:t>2019-03-22</a:t>
             </a:fld>
             <a:endParaRPr lang="en-US"/>
           </a:p>
@@ -1958,7 +1958,7 @@
           <a:p>
             <a:fld id="{6CEAB757-8E6E-4ABD-BC45-881DC5CE9DE2}" type="datetimeFigureOut">
               <a:rPr lang="en-US" smtClean="0"/>
-              <a:t>2018-12-24</a:t>
+              <a:t>2019-03-22</a:t>
             </a:fld>
             <a:endParaRPr lang="en-US"/>
           </a:p>
@@ -2071,7 +2071,7 @@
           <a:p>
             <a:fld id="{6CEAB757-8E6E-4ABD-BC45-881DC5CE9DE2}" type="datetimeFigureOut">
               <a:rPr lang="en-US" smtClean="0"/>
-              <a:t>2018-12-24</a:t>
+              <a:t>2019-03-22</a:t>
             </a:fld>
             <a:endParaRPr lang="en-US"/>
           </a:p>
@@ -2382,7 +2382,7 @@
           <a:p>
             <a:fld id="{6CEAB757-8E6E-4ABD-BC45-881DC5CE9DE2}" type="datetimeFigureOut">
               <a:rPr lang="en-US" smtClean="0"/>
-              <a:t>2018-12-24</a:t>
+              <a:t>2019-03-22</a:t>
             </a:fld>
             <a:endParaRPr lang="en-US"/>
           </a:p>
@@ -2670,7 +2670,7 @@
           <a:p>
             <a:fld id="{6CEAB757-8E6E-4ABD-BC45-881DC5CE9DE2}" type="datetimeFigureOut">
               <a:rPr lang="en-US" smtClean="0"/>
-              <a:t>2018-12-24</a:t>
+              <a:t>2019-03-22</a:t>
             </a:fld>
             <a:endParaRPr lang="en-US"/>
           </a:p>
@@ -2911,7 +2911,7 @@
           <a:p>
             <a:fld id="{6CEAB757-8E6E-4ABD-BC45-881DC5CE9DE2}" type="datetimeFigureOut">
               <a:rPr lang="en-US" smtClean="0"/>
-              <a:t>2018-12-24</a:t>
+              <a:t>2019-03-22</a:t>
             </a:fld>
             <a:endParaRPr lang="en-US"/>
           </a:p>
@@ -3606,7 +3606,7 @@
           </p:nvSpPr>
           <p:spPr>
             <a:xfrm>
-              <a:off x="5694100" y="2650575"/>
+              <a:off x="5694100" y="2646975"/>
               <a:ext cx="360000" cy="79200"/>
             </a:xfrm>
             <a:prstGeom prst="rect">
@@ -3730,7 +3730,9 @@
                 <a:prstGeom prst="rect">
                   <a:avLst/>
                 </a:prstGeom>
-                <a:grpFill/>
+                <a:solidFill>
+                  <a:srgbClr val="4F79FF"/>
+                </a:solidFill>
                 <a:ln w="28575">
                   <a:solidFill>
                     <a:schemeClr val="tx1"/>
@@ -3867,7 +3869,7 @@
               <a:lstStyle/>
               <a:p>
                 <a:pPr algn="ctr"/>
-                <a:endParaRPr lang="en-US"/>
+                <a:endParaRPr lang="en-US" dirty="0"/>
               </a:p>
             </p:txBody>
           </p:sp>
@@ -4095,6 +4097,658 @@
           </a:p>
         </p:txBody>
       </p:sp>
+      <p:grpSp>
+        <p:nvGrpSpPr>
+          <p:cNvPr id="38" name="Group 37">
+            <a:extLst>
+              <a:ext uri="{FF2B5EF4-FFF2-40B4-BE49-F238E27FC236}">
+                <a16:creationId xmlns:a16="http://schemas.microsoft.com/office/drawing/2014/main" id="{9B4597E4-0748-4847-A9CB-3ABBA0FBF5FA}"/>
+              </a:ext>
+            </a:extLst>
+          </p:cNvPr>
+          <p:cNvGrpSpPr/>
+          <p:nvPr/>
+        </p:nvGrpSpPr>
+        <p:grpSpPr>
+          <a:xfrm>
+            <a:off x="5970979" y="3188567"/>
+            <a:ext cx="973045" cy="566977"/>
+            <a:chOff x="5202309" y="2405342"/>
+            <a:chExt cx="973045" cy="566977"/>
+          </a:xfrm>
+        </p:grpSpPr>
+        <p:grpSp>
+          <p:nvGrpSpPr>
+            <p:cNvPr id="39" name="Group 38">
+              <a:extLst>
+                <a:ext uri="{FF2B5EF4-FFF2-40B4-BE49-F238E27FC236}">
+                  <a16:creationId xmlns:a16="http://schemas.microsoft.com/office/drawing/2014/main" id="{E0A9534C-9DA6-44AB-BE11-EB6DE068A216}"/>
+                </a:ext>
+              </a:extLst>
+            </p:cNvPr>
+            <p:cNvGrpSpPr/>
+            <p:nvPr/>
+          </p:nvGrpSpPr>
+          <p:grpSpPr>
+            <a:xfrm>
+              <a:off x="5202309" y="2405342"/>
+              <a:ext cx="973045" cy="566977"/>
+              <a:chOff x="1908051" y="2439046"/>
+              <a:chExt cx="973045" cy="566977"/>
+            </a:xfrm>
+          </p:grpSpPr>
+          <p:grpSp>
+            <p:nvGrpSpPr>
+              <p:cNvPr id="41" name="Group 40">
+                <a:extLst>
+                  <a:ext uri="{FF2B5EF4-FFF2-40B4-BE49-F238E27FC236}">
+                    <a16:creationId xmlns:a16="http://schemas.microsoft.com/office/drawing/2014/main" id="{C45F9BCE-0E33-4F27-803F-C2DC5F808169}"/>
+                  </a:ext>
+                </a:extLst>
+              </p:cNvPr>
+              <p:cNvGrpSpPr/>
+              <p:nvPr/>
+            </p:nvGrpSpPr>
+            <p:grpSpPr>
+              <a:xfrm>
+                <a:off x="1908051" y="2439046"/>
+                <a:ext cx="973045" cy="566977"/>
+                <a:chOff x="1908051" y="2439046"/>
+                <a:chExt cx="973045" cy="566977"/>
+              </a:xfrm>
+            </p:grpSpPr>
+            <p:sp>
+              <p:nvSpPr>
+                <p:cNvPr id="43" name="Rectangle 42">
+                  <a:extLst>
+                    <a:ext uri="{FF2B5EF4-FFF2-40B4-BE49-F238E27FC236}">
+                      <a16:creationId xmlns:a16="http://schemas.microsoft.com/office/drawing/2014/main" id="{3686AE4C-07BD-4126-A5A5-4080B04A8456}"/>
+                    </a:ext>
+                  </a:extLst>
+                </p:cNvPr>
+                <p:cNvSpPr/>
+                <p:nvPr/>
+              </p:nvSpPr>
+              <p:spPr>
+                <a:xfrm>
+                  <a:off x="1908051" y="2439046"/>
+                  <a:ext cx="828000" cy="566977"/>
+                </a:xfrm>
+                <a:prstGeom prst="rect">
+                  <a:avLst/>
+                </a:prstGeom>
+                <a:solidFill>
+                  <a:srgbClr val="00B050"/>
+                </a:solidFill>
+                <a:ln w="28575">
+                  <a:solidFill>
+                    <a:schemeClr val="tx1"/>
+                  </a:solidFill>
+                </a:ln>
+              </p:spPr>
+              <p:style>
+                <a:lnRef idx="2">
+                  <a:schemeClr val="accent1">
+                    <a:shade val="50000"/>
+                  </a:schemeClr>
+                </a:lnRef>
+                <a:fillRef idx="1">
+                  <a:schemeClr val="accent1"/>
+                </a:fillRef>
+                <a:effectRef idx="0">
+                  <a:schemeClr val="accent1"/>
+                </a:effectRef>
+                <a:fontRef idx="minor">
+                  <a:schemeClr val="lt1"/>
+                </a:fontRef>
+              </p:style>
+              <p:txBody>
+                <a:bodyPr rtlCol="0" anchor="ctr"/>
+                <a:lstStyle/>
+                <a:p>
+                  <a:pPr algn="ctr"/>
+                  <a:endParaRPr lang="en-US" dirty="0">
+                    <a:solidFill>
+                      <a:srgbClr val="FF5353"/>
+                    </a:solidFill>
+                  </a:endParaRPr>
+                </a:p>
+              </p:txBody>
+            </p:sp>
+            <p:sp>
+              <p:nvSpPr>
+                <p:cNvPr id="44" name="Rectangle 43">
+                  <a:extLst>
+                    <a:ext uri="{FF2B5EF4-FFF2-40B4-BE49-F238E27FC236}">
+                      <a16:creationId xmlns:a16="http://schemas.microsoft.com/office/drawing/2014/main" id="{6AB6ECCD-6354-47C8-86F0-DD84D16DCE3A}"/>
+                    </a:ext>
+                  </a:extLst>
+                </p:cNvPr>
+                <p:cNvSpPr/>
+                <p:nvPr/>
+              </p:nvSpPr>
+              <p:spPr>
+                <a:xfrm>
+                  <a:off x="2377096" y="2666279"/>
+                  <a:ext cx="504000" cy="108000"/>
+                </a:xfrm>
+                <a:prstGeom prst="rect">
+                  <a:avLst/>
+                </a:prstGeom>
+                <a:solidFill>
+                  <a:srgbClr val="00B050"/>
+                </a:solidFill>
+                <a:ln w="28575">
+                  <a:solidFill>
+                    <a:schemeClr val="tx1"/>
+                  </a:solidFill>
+                </a:ln>
+              </p:spPr>
+              <p:style>
+                <a:lnRef idx="2">
+                  <a:schemeClr val="accent1">
+                    <a:shade val="50000"/>
+                  </a:schemeClr>
+                </a:lnRef>
+                <a:fillRef idx="1">
+                  <a:schemeClr val="accent1"/>
+                </a:fillRef>
+                <a:effectRef idx="0">
+                  <a:schemeClr val="accent1"/>
+                </a:effectRef>
+                <a:fontRef idx="minor">
+                  <a:schemeClr val="lt1"/>
+                </a:fontRef>
+              </p:style>
+              <p:txBody>
+                <a:bodyPr rtlCol="0" anchor="ctr"/>
+                <a:lstStyle/>
+                <a:p>
+                  <a:pPr algn="ctr"/>
+                  <a:endParaRPr lang="en-US"/>
+                </a:p>
+              </p:txBody>
+            </p:sp>
+          </p:grpSp>
+          <p:sp>
+            <p:nvSpPr>
+              <p:cNvPr id="42" name="Oval 41">
+                <a:extLst>
+                  <a:ext uri="{FF2B5EF4-FFF2-40B4-BE49-F238E27FC236}">
+                    <a16:creationId xmlns:a16="http://schemas.microsoft.com/office/drawing/2014/main" id="{77B7BBD3-727A-4DBC-A1DC-F850FD368B69}"/>
+                  </a:ext>
+                </a:extLst>
+              </p:cNvPr>
+              <p:cNvSpPr/>
+              <p:nvPr/>
+            </p:nvSpPr>
+            <p:spPr>
+              <a:xfrm>
+                <a:off x="2124051" y="2522279"/>
+                <a:ext cx="396000" cy="396000"/>
+              </a:xfrm>
+              <a:prstGeom prst="ellipse">
+                <a:avLst/>
+              </a:prstGeom>
+              <a:solidFill>
+                <a:srgbClr val="00B050"/>
+              </a:solidFill>
+              <a:ln w="28575">
+                <a:solidFill>
+                  <a:schemeClr val="tx1"/>
+                </a:solidFill>
+              </a:ln>
+            </p:spPr>
+            <p:style>
+              <a:lnRef idx="2">
+                <a:schemeClr val="accent1">
+                  <a:shade val="50000"/>
+                </a:schemeClr>
+              </a:lnRef>
+              <a:fillRef idx="1">
+                <a:schemeClr val="accent1"/>
+              </a:fillRef>
+              <a:effectRef idx="0">
+                <a:schemeClr val="accent1"/>
+              </a:effectRef>
+              <a:fontRef idx="minor">
+                <a:schemeClr val="lt1"/>
+              </a:fontRef>
+            </p:style>
+            <p:txBody>
+              <a:bodyPr rtlCol="0" anchor="ctr"/>
+              <a:lstStyle/>
+              <a:p>
+                <a:pPr algn="ctr"/>
+                <a:endParaRPr lang="en-US"/>
+              </a:p>
+            </p:txBody>
+          </p:sp>
+        </p:grpSp>
+        <p:sp>
+          <p:nvSpPr>
+            <p:cNvPr id="40" name="Rectangle 39">
+              <a:extLst>
+                <a:ext uri="{FF2B5EF4-FFF2-40B4-BE49-F238E27FC236}">
+                  <a16:creationId xmlns:a16="http://schemas.microsoft.com/office/drawing/2014/main" id="{5F9112F5-4D3B-42E5-AA95-0E6D54188B06}"/>
+                </a:ext>
+              </a:extLst>
+            </p:cNvPr>
+            <p:cNvSpPr/>
+            <p:nvPr/>
+          </p:nvSpPr>
+          <p:spPr>
+            <a:xfrm>
+              <a:off x="5692683" y="2647975"/>
+              <a:ext cx="360000" cy="79200"/>
+            </a:xfrm>
+            <a:prstGeom prst="rect">
+              <a:avLst/>
+            </a:prstGeom>
+            <a:solidFill>
+              <a:srgbClr val="00B050"/>
+            </a:solidFill>
+            <a:ln w="19050">
+              <a:noFill/>
+            </a:ln>
+          </p:spPr>
+          <p:style>
+            <a:lnRef idx="2">
+              <a:schemeClr val="accent1">
+                <a:shade val="50000"/>
+              </a:schemeClr>
+            </a:lnRef>
+            <a:fillRef idx="1">
+              <a:schemeClr val="accent1"/>
+            </a:fillRef>
+            <a:effectRef idx="0">
+              <a:schemeClr val="accent1"/>
+            </a:effectRef>
+            <a:fontRef idx="minor">
+              <a:schemeClr val="lt1"/>
+            </a:fontRef>
+          </p:style>
+          <p:txBody>
+            <a:bodyPr rtlCol="0" anchor="ctr"/>
+            <a:lstStyle/>
+            <a:p>
+              <a:pPr algn="ctr"/>
+              <a:endParaRPr lang="en-US"/>
+            </a:p>
+          </p:txBody>
+        </p:sp>
+      </p:grpSp>
+      <p:grpSp>
+        <p:nvGrpSpPr>
+          <p:cNvPr id="45" name="Group 44">
+            <a:extLst>
+              <a:ext uri="{FF2B5EF4-FFF2-40B4-BE49-F238E27FC236}">
+                <a16:creationId xmlns:a16="http://schemas.microsoft.com/office/drawing/2014/main" id="{A96AF81B-ED7D-4CAA-9D55-2ADC6289BDF8}"/>
+              </a:ext>
+            </a:extLst>
+          </p:cNvPr>
+          <p:cNvGrpSpPr/>
+          <p:nvPr/>
+        </p:nvGrpSpPr>
+        <p:grpSpPr>
+          <a:xfrm>
+            <a:off x="4478529" y="4006261"/>
+            <a:ext cx="973045" cy="566977"/>
+            <a:chOff x="5202309" y="2405342"/>
+            <a:chExt cx="973045" cy="566977"/>
+          </a:xfrm>
+        </p:grpSpPr>
+        <p:grpSp>
+          <p:nvGrpSpPr>
+            <p:cNvPr id="46" name="Group 45">
+              <a:extLst>
+                <a:ext uri="{FF2B5EF4-FFF2-40B4-BE49-F238E27FC236}">
+                  <a16:creationId xmlns:a16="http://schemas.microsoft.com/office/drawing/2014/main" id="{34039DC1-7DEE-452D-B468-E80E9E342791}"/>
+                </a:ext>
+              </a:extLst>
+            </p:cNvPr>
+            <p:cNvGrpSpPr/>
+            <p:nvPr/>
+          </p:nvGrpSpPr>
+          <p:grpSpPr>
+            <a:xfrm>
+              <a:off x="5202309" y="2405342"/>
+              <a:ext cx="973045" cy="566977"/>
+              <a:chOff x="1908051" y="2439046"/>
+              <a:chExt cx="973045" cy="566977"/>
+            </a:xfrm>
+          </p:grpSpPr>
+          <p:grpSp>
+            <p:nvGrpSpPr>
+              <p:cNvPr id="48" name="Group 47">
+                <a:extLst>
+                  <a:ext uri="{FF2B5EF4-FFF2-40B4-BE49-F238E27FC236}">
+                    <a16:creationId xmlns:a16="http://schemas.microsoft.com/office/drawing/2014/main" id="{44B7B1A1-48CB-4F4D-ACEB-97F8E8AB6F7D}"/>
+                  </a:ext>
+                </a:extLst>
+              </p:cNvPr>
+              <p:cNvGrpSpPr/>
+              <p:nvPr/>
+            </p:nvGrpSpPr>
+            <p:grpSpPr>
+              <a:xfrm>
+                <a:off x="1908051" y="2439046"/>
+                <a:ext cx="973045" cy="566977"/>
+                <a:chOff x="1908051" y="2439046"/>
+                <a:chExt cx="973045" cy="566977"/>
+              </a:xfrm>
+            </p:grpSpPr>
+            <p:sp>
+              <p:nvSpPr>
+                <p:cNvPr id="50" name="Rectangle 49">
+                  <a:extLst>
+                    <a:ext uri="{FF2B5EF4-FFF2-40B4-BE49-F238E27FC236}">
+                      <a16:creationId xmlns:a16="http://schemas.microsoft.com/office/drawing/2014/main" id="{143F7EF8-51B9-4E2C-AF35-C185718F363F}"/>
+                    </a:ext>
+                  </a:extLst>
+                </p:cNvPr>
+                <p:cNvSpPr/>
+                <p:nvPr/>
+              </p:nvSpPr>
+              <p:spPr>
+                <a:xfrm>
+                  <a:off x="1908051" y="2439046"/>
+                  <a:ext cx="828000" cy="566977"/>
+                </a:xfrm>
+                <a:prstGeom prst="rect">
+                  <a:avLst/>
+                </a:prstGeom>
+                <a:solidFill>
+                  <a:srgbClr val="FF9E01"/>
+                </a:solidFill>
+                <a:ln w="28575">
+                  <a:solidFill>
+                    <a:schemeClr val="tx1"/>
+                  </a:solidFill>
+                </a:ln>
+              </p:spPr>
+              <p:style>
+                <a:lnRef idx="2">
+                  <a:schemeClr val="accent1">
+                    <a:shade val="50000"/>
+                  </a:schemeClr>
+                </a:lnRef>
+                <a:fillRef idx="1">
+                  <a:schemeClr val="accent1"/>
+                </a:fillRef>
+                <a:effectRef idx="0">
+                  <a:schemeClr val="accent1"/>
+                </a:effectRef>
+                <a:fontRef idx="minor">
+                  <a:schemeClr val="lt1"/>
+                </a:fontRef>
+              </p:style>
+              <p:txBody>
+                <a:bodyPr rtlCol="0" anchor="ctr"/>
+                <a:lstStyle/>
+                <a:p>
+                  <a:pPr algn="ctr"/>
+                  <a:endParaRPr lang="en-US" dirty="0">
+                    <a:solidFill>
+                      <a:srgbClr val="FF5353"/>
+                    </a:solidFill>
+                  </a:endParaRPr>
+                </a:p>
+              </p:txBody>
+            </p:sp>
+            <p:sp>
+              <p:nvSpPr>
+                <p:cNvPr id="51" name="Rectangle 50">
+                  <a:extLst>
+                    <a:ext uri="{FF2B5EF4-FFF2-40B4-BE49-F238E27FC236}">
+                      <a16:creationId xmlns:a16="http://schemas.microsoft.com/office/drawing/2014/main" id="{A7BEDBAD-CA3A-46E3-BB15-09BD81E0D737}"/>
+                    </a:ext>
+                  </a:extLst>
+                </p:cNvPr>
+                <p:cNvSpPr/>
+                <p:nvPr/>
+              </p:nvSpPr>
+              <p:spPr>
+                <a:xfrm>
+                  <a:off x="2377096" y="2666279"/>
+                  <a:ext cx="504000" cy="108000"/>
+                </a:xfrm>
+                <a:prstGeom prst="rect">
+                  <a:avLst/>
+                </a:prstGeom>
+                <a:solidFill>
+                  <a:srgbClr val="FF9E01"/>
+                </a:solidFill>
+                <a:ln w="28575">
+                  <a:solidFill>
+                    <a:schemeClr val="tx1"/>
+                  </a:solidFill>
+                </a:ln>
+              </p:spPr>
+              <p:style>
+                <a:lnRef idx="2">
+                  <a:schemeClr val="accent1">
+                    <a:shade val="50000"/>
+                  </a:schemeClr>
+                </a:lnRef>
+                <a:fillRef idx="1">
+                  <a:schemeClr val="accent1"/>
+                </a:fillRef>
+                <a:effectRef idx="0">
+                  <a:schemeClr val="accent1"/>
+                </a:effectRef>
+                <a:fontRef idx="minor">
+                  <a:schemeClr val="lt1"/>
+                </a:fontRef>
+              </p:style>
+              <p:txBody>
+                <a:bodyPr rtlCol="0" anchor="ctr"/>
+                <a:lstStyle/>
+                <a:p>
+                  <a:pPr algn="ctr"/>
+                  <a:endParaRPr lang="en-US"/>
+                </a:p>
+              </p:txBody>
+            </p:sp>
+          </p:grpSp>
+          <p:sp>
+            <p:nvSpPr>
+              <p:cNvPr id="49" name="Oval 48">
+                <a:extLst>
+                  <a:ext uri="{FF2B5EF4-FFF2-40B4-BE49-F238E27FC236}">
+                    <a16:creationId xmlns:a16="http://schemas.microsoft.com/office/drawing/2014/main" id="{81320CFC-41A4-4AFD-A32F-7B4BDDDB5761}"/>
+                  </a:ext>
+                </a:extLst>
+              </p:cNvPr>
+              <p:cNvSpPr/>
+              <p:nvPr/>
+            </p:nvSpPr>
+            <p:spPr>
+              <a:xfrm>
+                <a:off x="2124051" y="2522279"/>
+                <a:ext cx="396000" cy="396000"/>
+              </a:xfrm>
+              <a:prstGeom prst="ellipse">
+                <a:avLst/>
+              </a:prstGeom>
+              <a:solidFill>
+                <a:srgbClr val="FF9E01"/>
+              </a:solidFill>
+              <a:ln w="28575">
+                <a:solidFill>
+                  <a:schemeClr val="tx1"/>
+                </a:solidFill>
+              </a:ln>
+            </p:spPr>
+            <p:style>
+              <a:lnRef idx="2">
+                <a:schemeClr val="accent1">
+                  <a:shade val="50000"/>
+                </a:schemeClr>
+              </a:lnRef>
+              <a:fillRef idx="1">
+                <a:schemeClr val="accent1"/>
+              </a:fillRef>
+              <a:effectRef idx="0">
+                <a:schemeClr val="accent1"/>
+              </a:effectRef>
+              <a:fontRef idx="minor">
+                <a:schemeClr val="lt1"/>
+              </a:fontRef>
+            </p:style>
+            <p:txBody>
+              <a:bodyPr rtlCol="0" anchor="ctr"/>
+              <a:lstStyle/>
+              <a:p>
+                <a:pPr algn="ctr"/>
+                <a:endParaRPr lang="en-US"/>
+              </a:p>
+            </p:txBody>
+          </p:sp>
+        </p:grpSp>
+        <p:sp>
+          <p:nvSpPr>
+            <p:cNvPr id="47" name="Rectangle 46">
+              <a:extLst>
+                <a:ext uri="{FF2B5EF4-FFF2-40B4-BE49-F238E27FC236}">
+                  <a16:creationId xmlns:a16="http://schemas.microsoft.com/office/drawing/2014/main" id="{11813360-4DC7-42FD-AD4B-12B820A01B99}"/>
+                </a:ext>
+              </a:extLst>
+            </p:cNvPr>
+            <p:cNvSpPr/>
+            <p:nvPr/>
+          </p:nvSpPr>
+          <p:spPr>
+            <a:xfrm>
+              <a:off x="5694100" y="2646975"/>
+              <a:ext cx="360000" cy="79200"/>
+            </a:xfrm>
+            <a:prstGeom prst="rect">
+              <a:avLst/>
+            </a:prstGeom>
+            <a:solidFill>
+              <a:srgbClr val="FF9E01"/>
+            </a:solidFill>
+            <a:ln w="19050">
+              <a:noFill/>
+            </a:ln>
+          </p:spPr>
+          <p:style>
+            <a:lnRef idx="2">
+              <a:schemeClr val="accent1">
+                <a:shade val="50000"/>
+              </a:schemeClr>
+            </a:lnRef>
+            <a:fillRef idx="1">
+              <a:schemeClr val="accent1"/>
+            </a:fillRef>
+            <a:effectRef idx="0">
+              <a:schemeClr val="accent1"/>
+            </a:effectRef>
+            <a:fontRef idx="minor">
+              <a:schemeClr val="lt1"/>
+            </a:fontRef>
+          </p:style>
+          <p:txBody>
+            <a:bodyPr rtlCol="0" anchor="ctr"/>
+            <a:lstStyle/>
+            <a:p>
+              <a:pPr algn="ctr"/>
+              <a:endParaRPr lang="en-US"/>
+            </a:p>
+          </p:txBody>
+        </p:sp>
+      </p:grpSp>
+      <p:pic>
+        <p:nvPicPr>
+          <p:cNvPr id="19" name="Picture 18">
+            <a:extLst>
+              <a:ext uri="{FF2B5EF4-FFF2-40B4-BE49-F238E27FC236}">
+                <a16:creationId xmlns:a16="http://schemas.microsoft.com/office/drawing/2014/main" id="{B8E787F8-2C6D-4743-9144-75E32BB4D9F9}"/>
+              </a:ext>
+            </a:extLst>
+          </p:cNvPr>
+          <p:cNvPicPr>
+            <a:picLocks noChangeAspect="1"/>
+          </p:cNvPicPr>
+          <p:nvPr/>
+        </p:nvPicPr>
+        <p:blipFill>
+          <a:blip r:embed="rId7"/>
+          <a:stretch>
+            <a:fillRect/>
+          </a:stretch>
+        </p:blipFill>
+        <p:spPr>
+          <a:xfrm>
+            <a:off x="4965052" y="5157947"/>
+            <a:ext cx="1005927" cy="597460"/>
+          </a:xfrm>
+          <a:prstGeom prst="rect">
+            <a:avLst/>
+          </a:prstGeom>
+        </p:spPr>
+      </p:pic>
+      <p:pic>
+        <p:nvPicPr>
+          <p:cNvPr id="60" name="Picture 59">
+            <a:extLst>
+              <a:ext uri="{FF2B5EF4-FFF2-40B4-BE49-F238E27FC236}">
+                <a16:creationId xmlns:a16="http://schemas.microsoft.com/office/drawing/2014/main" id="{B7239450-952B-44EC-B4BC-29BE74F8B85F}"/>
+              </a:ext>
+            </a:extLst>
+          </p:cNvPr>
+          <p:cNvPicPr>
+            <a:picLocks noChangeAspect="1"/>
+          </p:cNvPicPr>
+          <p:nvPr/>
+        </p:nvPicPr>
+        <p:blipFill>
+          <a:blip r:embed="rId8"/>
+          <a:stretch>
+            <a:fillRect/>
+          </a:stretch>
+        </p:blipFill>
+        <p:spPr>
+          <a:xfrm>
+            <a:off x="5671354" y="4108509"/>
+            <a:ext cx="999831" cy="597460"/>
+          </a:xfrm>
+          <a:prstGeom prst="rect">
+            <a:avLst/>
+          </a:prstGeom>
+        </p:spPr>
+      </p:pic>
+      <p:pic>
+        <p:nvPicPr>
+          <p:cNvPr id="70" name="Picture 69">
+            <a:extLst>
+              <a:ext uri="{FF2B5EF4-FFF2-40B4-BE49-F238E27FC236}">
+                <a16:creationId xmlns:a16="http://schemas.microsoft.com/office/drawing/2014/main" id="{E5A81711-F40B-47EA-8A5A-92F82B3BE07C}"/>
+              </a:ext>
+            </a:extLst>
+          </p:cNvPr>
+          <p:cNvPicPr>
+            <a:picLocks noChangeAspect="1"/>
+          </p:cNvPicPr>
+          <p:nvPr/>
+        </p:nvPicPr>
+        <p:blipFill>
+          <a:blip r:embed="rId9"/>
+          <a:stretch>
+            <a:fillRect/>
+          </a:stretch>
+        </p:blipFill>
+        <p:spPr>
+          <a:xfrm>
+            <a:off x="4647292" y="3282525"/>
+            <a:ext cx="1000341" cy="595295"/>
+          </a:xfrm>
+          <a:prstGeom prst="rect">
+            <a:avLst/>
+          </a:prstGeom>
+        </p:spPr>
+      </p:pic>
     </p:spTree>
     <p:extLst>
       <p:ext uri="{BB962C8B-B14F-4D97-AF65-F5344CB8AC3E}">

</xml_diff>